<commit_message>
Added JIM Report 12. Updated report for Matan abstract
</commit_message>
<xml_diff>
--- a/Course4/Matan/Samusev_Visualization_R.pptx
+++ b/Course4/Matan/Samusev_Visualization_R.pptx
@@ -48,6 +48,19 @@
     <p:sldId id="296" r:id="rId42"/>
     <p:sldId id="297" r:id="rId43"/>
     <p:sldId id="298" r:id="rId44"/>
+    <p:sldId id="299" r:id="rId45"/>
+    <p:sldId id="300" r:id="rId46"/>
+    <p:sldId id="301" r:id="rId47"/>
+    <p:sldId id="302" r:id="rId48"/>
+    <p:sldId id="303" r:id="rId49"/>
+    <p:sldId id="304" r:id="rId50"/>
+    <p:sldId id="305" r:id="rId51"/>
+    <p:sldId id="306" r:id="rId52"/>
+    <p:sldId id="307" r:id="rId53"/>
+    <p:sldId id="308" r:id="rId54"/>
+    <p:sldId id="309" r:id="rId55"/>
+    <p:sldId id="310" r:id="rId56"/>
+    <p:sldId id="311" r:id="rId57"/>
   </p:sldIdLst>
   <p:sldSz cx="12192000" cy="6858000"/>
   <p:notesSz cx="6858000" cy="9144000"/>
@@ -323,7 +336,7 @@
           <a:p>
             <a:fld id="{A7614E69-9826-4E8F-9446-982D9F5B3700}" type="datetimeFigureOut">
               <a:rPr lang="ru-RU" smtClean="0"/>
-              <a:t>30.09.2021</a:t>
+              <a:t>04.10.2021</a:t>
             </a:fld>
             <a:endParaRPr lang="ru-RU"/>
           </a:p>
@@ -653,7 +666,7 @@
           <a:p>
             <a:fld id="{A7614E69-9826-4E8F-9446-982D9F5B3700}" type="datetimeFigureOut">
               <a:rPr lang="ru-RU" smtClean="0"/>
-              <a:t>30.09.2021</a:t>
+              <a:t>04.10.2021</a:t>
             </a:fld>
             <a:endParaRPr lang="ru-RU"/>
           </a:p>
@@ -833,7 +846,7 @@
           <a:p>
             <a:fld id="{A7614E69-9826-4E8F-9446-982D9F5B3700}" type="datetimeFigureOut">
               <a:rPr lang="ru-RU" smtClean="0"/>
-              <a:t>30.09.2021</a:t>
+              <a:t>04.10.2021</a:t>
             </a:fld>
             <a:endParaRPr lang="ru-RU"/>
           </a:p>
@@ -1003,7 +1016,7 @@
           <a:p>
             <a:fld id="{A7614E69-9826-4E8F-9446-982D9F5B3700}" type="datetimeFigureOut">
               <a:rPr lang="ru-RU" smtClean="0"/>
-              <a:t>30.09.2021</a:t>
+              <a:t>04.10.2021</a:t>
             </a:fld>
             <a:endParaRPr lang="ru-RU"/>
           </a:p>
@@ -1280,7 +1293,7 @@
           <a:p>
             <a:fld id="{A7614E69-9826-4E8F-9446-982D9F5B3700}" type="datetimeFigureOut">
               <a:rPr lang="ru-RU" smtClean="0"/>
-              <a:t>30.09.2021</a:t>
+              <a:t>04.10.2021</a:t>
             </a:fld>
             <a:endParaRPr lang="ru-RU"/>
           </a:p>
@@ -1674,7 +1687,7 @@
           <a:p>
             <a:fld id="{A7614E69-9826-4E8F-9446-982D9F5B3700}" type="datetimeFigureOut">
               <a:rPr lang="ru-RU" smtClean="0"/>
-              <a:t>30.09.2021</a:t>
+              <a:t>04.10.2021</a:t>
             </a:fld>
             <a:endParaRPr lang="ru-RU"/>
           </a:p>
@@ -2151,7 +2164,7 @@
           <a:p>
             <a:fld id="{A7614E69-9826-4E8F-9446-982D9F5B3700}" type="datetimeFigureOut">
               <a:rPr lang="ru-RU" smtClean="0"/>
-              <a:t>30.09.2021</a:t>
+              <a:t>04.10.2021</a:t>
             </a:fld>
             <a:endParaRPr lang="ru-RU"/>
           </a:p>
@@ -2269,7 +2282,7 @@
           <a:p>
             <a:fld id="{A7614E69-9826-4E8F-9446-982D9F5B3700}" type="datetimeFigureOut">
               <a:rPr lang="ru-RU" smtClean="0"/>
-              <a:t>30.09.2021</a:t>
+              <a:t>04.10.2021</a:t>
             </a:fld>
             <a:endParaRPr lang="ru-RU"/>
           </a:p>
@@ -2364,7 +2377,7 @@
           <a:p>
             <a:fld id="{A7614E69-9826-4E8F-9446-982D9F5B3700}" type="datetimeFigureOut">
               <a:rPr lang="ru-RU" smtClean="0"/>
-              <a:t>30.09.2021</a:t>
+              <a:t>04.10.2021</a:t>
             </a:fld>
             <a:endParaRPr lang="ru-RU"/>
           </a:p>
@@ -2710,7 +2723,7 @@
           <a:p>
             <a:fld id="{A7614E69-9826-4E8F-9446-982D9F5B3700}" type="datetimeFigureOut">
               <a:rPr lang="ru-RU" smtClean="0"/>
-              <a:t>30.09.2021</a:t>
+              <a:t>04.10.2021</a:t>
             </a:fld>
             <a:endParaRPr lang="ru-RU"/>
           </a:p>
@@ -3098,7 +3111,7 @@
           <a:p>
             <a:fld id="{A7614E69-9826-4E8F-9446-982D9F5B3700}" type="datetimeFigureOut">
               <a:rPr lang="ru-RU" smtClean="0"/>
-              <a:t>30.09.2021</a:t>
+              <a:t>04.10.2021</a:t>
             </a:fld>
             <a:endParaRPr lang="ru-RU"/>
           </a:p>
@@ -3376,7 +3389,7 @@
           <a:p>
             <a:fld id="{A7614E69-9826-4E8F-9446-982D9F5B3700}" type="datetimeFigureOut">
               <a:rPr lang="ru-RU" smtClean="0"/>
-              <a:t>30.09.2021</a:t>
+              <a:t>04.10.2021</a:t>
             </a:fld>
             <a:endParaRPr lang="ru-RU"/>
           </a:p>
@@ -5401,7 +5414,6 @@
               <a:rPr lang="ru-RU" dirty="0"/>
               <a:t>При построении гистограммы (как и любого другого типа графика) вы можете использовать не весь массив данных, а только его подмножество Например, можно посмотреть гистограмму только для субъектов с объемом экспорта менее 300</a:t>
             </a:r>
-            <a:endParaRPr lang="ru-RU" dirty="0"/>
           </a:p>
           <a:p>
             <a:pPr marL="0" indent="0">
@@ -8366,6 +8378,648 @@
 </p:sld>
 </file>
 
+<file path=ppt/slides/slide44.xml><?xml version="1.0" encoding="utf-8"?>
+<p:sld xmlns:a="http://schemas.openxmlformats.org/drawingml/2006/main" xmlns:r="http://schemas.openxmlformats.org/officeDocument/2006/relationships" xmlns:p="http://schemas.openxmlformats.org/presentationml/2006/main">
+  <p:cSld>
+    <p:spTree>
+      <p:nvGrpSpPr>
+        <p:cNvPr id="1" name=""/>
+        <p:cNvGrpSpPr/>
+        <p:nvPr/>
+      </p:nvGrpSpPr>
+      <p:grpSpPr>
+        <a:xfrm>
+          <a:off x="0" y="0"/>
+          <a:ext cx="0" cy="0"/>
+          <a:chOff x="0" y="0"/>
+          <a:chExt cx="0" cy="0"/>
+        </a:xfrm>
+      </p:grpSpPr>
+      <p:sp>
+        <p:nvSpPr>
+          <p:cNvPr id="2" name="Заголовок 1"/>
+          <p:cNvSpPr>
+            <a:spLocks noGrp="1"/>
+          </p:cNvSpPr>
+          <p:nvPr>
+            <p:ph type="ctrTitle"/>
+          </p:nvPr>
+        </p:nvSpPr>
+        <p:spPr/>
+        <p:txBody>
+          <a:bodyPr/>
+          <a:lstStyle/>
+          <a:p>
+            <a:r>
+              <a:rPr lang="ru-RU" dirty="0" smtClean="0"/>
+              <a:t>Продвинутая Графика </a:t>
+            </a:r>
+            <a:r>
+              <a:rPr lang="en-US" dirty="0" smtClean="0"/>
+              <a:t>R</a:t>
+            </a:r>
+            <a:endParaRPr lang="ru-RU" dirty="0"/>
+          </a:p>
+        </p:txBody>
+      </p:sp>
+      <p:sp>
+        <p:nvSpPr>
+          <p:cNvPr id="3" name="Подзаголовок 2"/>
+          <p:cNvSpPr>
+            <a:spLocks noGrp="1"/>
+          </p:cNvSpPr>
+          <p:nvPr>
+            <p:ph type="subTitle" idx="1"/>
+          </p:nvPr>
+        </p:nvSpPr>
+        <p:spPr/>
+        <p:txBody>
+          <a:bodyPr/>
+          <a:lstStyle/>
+          <a:p>
+            <a:endParaRPr lang="ru-RU"/>
+          </a:p>
+        </p:txBody>
+      </p:sp>
+    </p:spTree>
+    <p:extLst>
+      <p:ext uri="{BB962C8B-B14F-4D97-AF65-F5344CB8AC3E}">
+        <p14:creationId xmlns:p14="http://schemas.microsoft.com/office/powerpoint/2010/main" val="1293005664"/>
+      </p:ext>
+    </p:extLst>
+  </p:cSld>
+  <p:clrMapOvr>
+    <a:masterClrMapping/>
+  </p:clrMapOvr>
+</p:sld>
+</file>
+
+<file path=ppt/slides/slide45.xml><?xml version="1.0" encoding="utf-8"?>
+<p:sld xmlns:a="http://schemas.openxmlformats.org/drawingml/2006/main" xmlns:r="http://schemas.openxmlformats.org/officeDocument/2006/relationships" xmlns:p="http://schemas.openxmlformats.org/presentationml/2006/main">
+  <p:cSld>
+    <p:spTree>
+      <p:nvGrpSpPr>
+        <p:cNvPr id="1" name=""/>
+        <p:cNvGrpSpPr/>
+        <p:nvPr/>
+      </p:nvGrpSpPr>
+      <p:grpSpPr>
+        <a:xfrm>
+          <a:off x="0" y="0"/>
+          <a:ext cx="0" cy="0"/>
+          <a:chOff x="0" y="0"/>
+          <a:chExt cx="0" cy="0"/>
+        </a:xfrm>
+      </p:grpSpPr>
+      <p:sp>
+        <p:nvSpPr>
+          <p:cNvPr id="2" name="Заголовок 1"/>
+          <p:cNvSpPr>
+            <a:spLocks noGrp="1"/>
+          </p:cNvSpPr>
+          <p:nvPr>
+            <p:ph type="title"/>
+          </p:nvPr>
+        </p:nvSpPr>
+        <p:spPr/>
+        <p:txBody>
+          <a:bodyPr/>
+          <a:lstStyle/>
+          <a:p>
+            <a:pPr algn="ctr"/>
+            <a:r>
+              <a:rPr lang="ru-RU" dirty="0" smtClean="0"/>
+              <a:t>Построение графиков с помощью</a:t>
+            </a:r>
+            <a:r>
+              <a:rPr lang="en-US" dirty="0" smtClean="0"/>
+              <a:t> ggplot2 </a:t>
+            </a:r>
+            <a:endParaRPr lang="ru-RU" dirty="0"/>
+          </a:p>
+        </p:txBody>
+      </p:sp>
+      <p:sp>
+        <p:nvSpPr>
+          <p:cNvPr id="3" name="Объект 2"/>
+          <p:cNvSpPr>
+            <a:spLocks noGrp="1"/>
+          </p:cNvSpPr>
+          <p:nvPr>
+            <p:ph idx="1"/>
+          </p:nvPr>
+        </p:nvSpPr>
+        <p:spPr>
+          <a:xfrm>
+            <a:off x="1371600" y="2286000"/>
+            <a:ext cx="10332720" cy="3931920"/>
+          </a:xfrm>
+        </p:spPr>
+        <p:txBody>
+          <a:bodyPr>
+            <a:normAutofit/>
+          </a:bodyPr>
+          <a:lstStyle/>
+          <a:p>
+            <a:r>
+              <a:rPr lang="ru-RU" dirty="0" smtClean="0"/>
+              <a:t>Мы познакомимся с системой </a:t>
+            </a:r>
+            <a:r>
+              <a:rPr lang="ru-RU" b="1" dirty="0" smtClean="0">
+                <a:hlinkClick r:id="rId2"/>
+              </a:rPr>
+              <a:t>ggplot2</a:t>
+            </a:r>
+            <a:r>
+              <a:rPr lang="ru-RU" dirty="0" smtClean="0"/>
+              <a:t>. </a:t>
+            </a:r>
+            <a:r>
+              <a:rPr lang="ru-RU" b="1" dirty="0" err="1" smtClean="0"/>
+              <a:t>gg</a:t>
+            </a:r>
+            <a:r>
+              <a:rPr lang="ru-RU" dirty="0" smtClean="0"/>
+              <a:t> расшифровывается как </a:t>
+            </a:r>
+            <a:r>
+              <a:rPr lang="ru-RU" i="1" dirty="0" err="1" smtClean="0"/>
+              <a:t>grammar</a:t>
+            </a:r>
+            <a:r>
+              <a:rPr lang="ru-RU" i="1" dirty="0" smtClean="0"/>
+              <a:t> </a:t>
+            </a:r>
+            <a:r>
+              <a:rPr lang="ru-RU" i="1" dirty="0" err="1" smtClean="0"/>
+              <a:t>of</a:t>
+            </a:r>
+            <a:r>
+              <a:rPr lang="ru-RU" i="1" dirty="0" smtClean="0"/>
+              <a:t> </a:t>
+            </a:r>
+            <a:r>
+              <a:rPr lang="ru-RU" i="1" dirty="0" err="1" smtClean="0"/>
+              <a:t>graphics</a:t>
+            </a:r>
+            <a:r>
+              <a:rPr lang="ru-RU" dirty="0" smtClean="0"/>
+              <a:t>. Под этим понимается определенная система правил, позволяющих описывать и строить графики. </a:t>
+            </a:r>
+            <a:r>
+              <a:rPr lang="ru-RU" dirty="0" err="1" smtClean="0"/>
+              <a:t>ggplot</a:t>
+            </a:r>
+            <a:r>
+              <a:rPr lang="ru-RU" dirty="0" smtClean="0"/>
+              <a:t> довольно сильно отличается от стандартной графической подсистемы R. Прежде всего — модульным подходом к построению изображений. В </a:t>
+            </a:r>
+            <a:r>
+              <a:rPr lang="ru-RU" dirty="0" err="1" smtClean="0"/>
+              <a:t>ggplot</a:t>
+            </a:r>
+            <a:r>
+              <a:rPr lang="ru-RU" dirty="0" smtClean="0"/>
+              <a:t> вы собираете графики «по кирпичикам», отдельно определяя источник данных, способы изображения, параметры системы координат и т.д. – путем вызова и </a:t>
+            </a:r>
+            <a:r>
+              <a:rPr lang="ru-RU" i="1" dirty="0" smtClean="0"/>
+              <a:t>сложения</a:t>
+            </a:r>
+            <a:r>
+              <a:rPr lang="ru-RU" dirty="0" smtClean="0"/>
+              <a:t> результатов соответствующих функций.</a:t>
+            </a:r>
+          </a:p>
+        </p:txBody>
+      </p:sp>
+    </p:spTree>
+    <p:extLst>
+      <p:ext uri="{BB962C8B-B14F-4D97-AF65-F5344CB8AC3E}">
+        <p14:creationId xmlns:p14="http://schemas.microsoft.com/office/powerpoint/2010/main" val="2257049780"/>
+      </p:ext>
+    </p:extLst>
+  </p:cSld>
+  <p:clrMapOvr>
+    <a:masterClrMapping/>
+  </p:clrMapOvr>
+</p:sld>
+</file>
+
+<file path=ppt/slides/slide46.xml><?xml version="1.0" encoding="utf-8"?>
+<p:sld xmlns:a="http://schemas.openxmlformats.org/drawingml/2006/main" xmlns:r="http://schemas.openxmlformats.org/officeDocument/2006/relationships" xmlns:p="http://schemas.openxmlformats.org/presentationml/2006/main">
+  <p:cSld>
+    <p:spTree>
+      <p:nvGrpSpPr>
+        <p:cNvPr id="1" name=""/>
+        <p:cNvGrpSpPr/>
+        <p:nvPr/>
+      </p:nvGrpSpPr>
+      <p:grpSpPr>
+        <a:xfrm>
+          <a:off x="0" y="0"/>
+          <a:ext cx="0" cy="0"/>
+          <a:chOff x="0" y="0"/>
+          <a:chExt cx="0" cy="0"/>
+        </a:xfrm>
+      </p:grpSpPr>
+      <p:sp>
+        <p:nvSpPr>
+          <p:cNvPr id="3" name="Объект 2"/>
+          <p:cNvSpPr>
+            <a:spLocks noGrp="1"/>
+          </p:cNvSpPr>
+          <p:nvPr>
+            <p:ph idx="1"/>
+          </p:nvPr>
+        </p:nvSpPr>
+        <p:spPr>
+          <a:xfrm>
+            <a:off x="1512917" y="864524"/>
+            <a:ext cx="9601200" cy="3581400"/>
+          </a:xfrm>
+        </p:spPr>
+        <p:txBody>
+          <a:bodyPr>
+            <a:normAutofit/>
+          </a:bodyPr>
+          <a:lstStyle/>
+          <a:p>
+            <a:r>
+              <a:rPr lang="ru-RU" dirty="0"/>
+              <a:t>При построении элементарных графиков </a:t>
+            </a:r>
+            <a:r>
+              <a:rPr lang="ru-RU" b="1" dirty="0" err="1"/>
+              <a:t>ggplot</a:t>
+            </a:r>
+            <a:r>
+              <a:rPr lang="ru-RU" dirty="0"/>
+              <a:t> может </a:t>
+            </a:r>
+            <a:r>
+              <a:rPr lang="ru-RU" dirty="0" smtClean="0"/>
+              <a:t>показаться сложнее</a:t>
+            </a:r>
+            <a:r>
+              <a:rPr lang="ru-RU" dirty="0"/>
+              <a:t>, чем стандартная графическая подсистема. Однако при усложнении требований к внешнему виду и информационному насыщению графика сложность </a:t>
+            </a:r>
+            <a:r>
+              <a:rPr lang="ru-RU" dirty="0" err="1"/>
+              <a:t>ggplot</a:t>
+            </a:r>
+            <a:r>
+              <a:rPr lang="ru-RU" dirty="0"/>
+              <a:t> оказывается преимуществом, и с ее помощью </a:t>
+            </a:r>
+            <a:r>
+              <a:rPr lang="ru-RU" i="1" dirty="0"/>
+              <a:t>относительно просто</a:t>
+            </a:r>
+            <a:r>
+              <a:rPr lang="ru-RU" dirty="0"/>
+              <a:t> можно получать элегантные и информативные визуализации, на создание которых с помощью стандартной подсистемы пришлось бы затратить невероятные </a:t>
+            </a:r>
+            <a:r>
+              <a:rPr lang="ru-RU" dirty="0" smtClean="0"/>
+              <a:t>усилия.</a:t>
+            </a:r>
+          </a:p>
+        </p:txBody>
+      </p:sp>
+    </p:spTree>
+    <p:extLst>
+      <p:ext uri="{BB962C8B-B14F-4D97-AF65-F5344CB8AC3E}">
+        <p14:creationId xmlns:p14="http://schemas.microsoft.com/office/powerpoint/2010/main" val="3579573376"/>
+      </p:ext>
+    </p:extLst>
+  </p:cSld>
+  <p:clrMapOvr>
+    <a:masterClrMapping/>
+  </p:clrMapOvr>
+</p:sld>
+</file>
+
+<file path=ppt/slides/slide47.xml><?xml version="1.0" encoding="utf-8"?>
+<p:sld xmlns:a="http://schemas.openxmlformats.org/drawingml/2006/main" xmlns:r="http://schemas.openxmlformats.org/officeDocument/2006/relationships" xmlns:p="http://schemas.openxmlformats.org/presentationml/2006/main">
+  <p:cSld>
+    <p:spTree>
+      <p:nvGrpSpPr>
+        <p:cNvPr id="1" name=""/>
+        <p:cNvGrpSpPr/>
+        <p:nvPr/>
+      </p:nvGrpSpPr>
+      <p:grpSpPr>
+        <a:xfrm>
+          <a:off x="0" y="0"/>
+          <a:ext cx="0" cy="0"/>
+          <a:chOff x="0" y="0"/>
+          <a:chExt cx="0" cy="0"/>
+        </a:xfrm>
+      </p:grpSpPr>
+      <p:sp>
+        <p:nvSpPr>
+          <p:cNvPr id="3" name="Объект 2"/>
+          <p:cNvSpPr>
+            <a:spLocks noGrp="1"/>
+          </p:cNvSpPr>
+          <p:nvPr>
+            <p:ph idx="1"/>
+          </p:nvPr>
+        </p:nvSpPr>
+        <p:spPr>
+          <a:xfrm>
+            <a:off x="1529542" y="299258"/>
+            <a:ext cx="9601200" cy="3581400"/>
+          </a:xfrm>
+        </p:spPr>
+        <p:txBody>
+          <a:bodyPr/>
+          <a:lstStyle/>
+          <a:p>
+            <a:r>
+              <a:rPr lang="ru-RU" dirty="0"/>
+              <a:t>Базовый (минимально необходимый) шаблон построения графика через </a:t>
+            </a:r>
+            <a:r>
+              <a:rPr lang="ru-RU" b="1" dirty="0" err="1"/>
+              <a:t>ggplot</a:t>
+            </a:r>
+            <a:r>
+              <a:rPr lang="ru-RU" dirty="0"/>
+              <a:t> выглядит следующим образом:</a:t>
+            </a:r>
+            <a:endParaRPr lang="ru-RU" dirty="0"/>
+          </a:p>
+        </p:txBody>
+      </p:sp>
+      <p:pic>
+        <p:nvPicPr>
+          <p:cNvPr id="5" name="Рисунок 4"/>
+          <p:cNvPicPr>
+            <a:picLocks noChangeAspect="1"/>
+          </p:cNvPicPr>
+          <p:nvPr/>
+        </p:nvPicPr>
+        <p:blipFill>
+          <a:blip r:embed="rId2"/>
+          <a:stretch>
+            <a:fillRect/>
+          </a:stretch>
+        </p:blipFill>
+        <p:spPr>
+          <a:xfrm>
+            <a:off x="3253567" y="1495684"/>
+            <a:ext cx="6153150" cy="923925"/>
+          </a:xfrm>
+          <a:prstGeom prst="rect">
+            <a:avLst/>
+          </a:prstGeom>
+        </p:spPr>
+      </p:pic>
+      <p:pic>
+        <p:nvPicPr>
+          <p:cNvPr id="6" name="Рисунок 5"/>
+          <p:cNvPicPr>
+            <a:picLocks noChangeAspect="1"/>
+          </p:cNvPicPr>
+          <p:nvPr/>
+        </p:nvPicPr>
+        <p:blipFill>
+          <a:blip r:embed="rId3"/>
+          <a:stretch>
+            <a:fillRect/>
+          </a:stretch>
+        </p:blipFill>
+        <p:spPr>
+          <a:xfrm>
+            <a:off x="1529542" y="2651934"/>
+            <a:ext cx="9625163" cy="3125412"/>
+          </a:xfrm>
+          <a:prstGeom prst="rect">
+            <a:avLst/>
+          </a:prstGeom>
+        </p:spPr>
+      </p:pic>
+    </p:spTree>
+    <p:extLst>
+      <p:ext uri="{BB962C8B-B14F-4D97-AF65-F5344CB8AC3E}">
+        <p14:creationId xmlns:p14="http://schemas.microsoft.com/office/powerpoint/2010/main" val="3576630197"/>
+      </p:ext>
+    </p:extLst>
+  </p:cSld>
+  <p:clrMapOvr>
+    <a:masterClrMapping/>
+  </p:clrMapOvr>
+</p:sld>
+</file>
+
+<file path=ppt/slides/slide48.xml><?xml version="1.0" encoding="utf-8"?>
+<p:sld xmlns:a="http://schemas.openxmlformats.org/drawingml/2006/main" xmlns:r="http://schemas.openxmlformats.org/officeDocument/2006/relationships" xmlns:p="http://schemas.openxmlformats.org/presentationml/2006/main">
+  <p:cSld>
+    <p:spTree>
+      <p:nvGrpSpPr>
+        <p:cNvPr id="1" name=""/>
+        <p:cNvGrpSpPr/>
+        <p:nvPr/>
+      </p:nvGrpSpPr>
+      <p:grpSpPr>
+        <a:xfrm>
+          <a:off x="0" y="0"/>
+          <a:ext cx="0" cy="0"/>
+          <a:chOff x="0" y="0"/>
+          <a:chExt cx="0" cy="0"/>
+        </a:xfrm>
+      </p:grpSpPr>
+      <p:sp>
+        <p:nvSpPr>
+          <p:cNvPr id="2" name="Заголовок 1"/>
+          <p:cNvSpPr>
+            <a:spLocks noGrp="1"/>
+          </p:cNvSpPr>
+          <p:nvPr>
+            <p:ph type="title"/>
+          </p:nvPr>
+        </p:nvSpPr>
+        <p:spPr>
+          <a:xfrm>
+            <a:off x="1371600" y="156036"/>
+            <a:ext cx="9601200" cy="1485900"/>
+          </a:xfrm>
+        </p:spPr>
+        <p:txBody>
+          <a:bodyPr/>
+          <a:lstStyle/>
+          <a:p>
+            <a:pPr algn="ctr"/>
+            <a:r>
+              <a:rPr lang="ru-RU" dirty="0" smtClean="0"/>
+              <a:t>Пример</a:t>
+            </a:r>
+            <a:endParaRPr lang="ru-RU" dirty="0"/>
+          </a:p>
+        </p:txBody>
+      </p:sp>
+      <p:pic>
+        <p:nvPicPr>
+          <p:cNvPr id="4" name="Рисунок 3"/>
+          <p:cNvPicPr>
+            <a:picLocks noChangeAspect="1"/>
+          </p:cNvPicPr>
+          <p:nvPr/>
+        </p:nvPicPr>
+        <p:blipFill>
+          <a:blip r:embed="rId2"/>
+          <a:stretch>
+            <a:fillRect/>
+          </a:stretch>
+        </p:blipFill>
+        <p:spPr>
+          <a:xfrm>
+            <a:off x="2798940" y="972069"/>
+            <a:ext cx="6746518" cy="669867"/>
+          </a:xfrm>
+          <a:prstGeom prst="rect">
+            <a:avLst/>
+          </a:prstGeom>
+        </p:spPr>
+      </p:pic>
+      <p:pic>
+        <p:nvPicPr>
+          <p:cNvPr id="5" name="Рисунок 4"/>
+          <p:cNvPicPr>
+            <a:picLocks noChangeAspect="1"/>
+          </p:cNvPicPr>
+          <p:nvPr/>
+        </p:nvPicPr>
+        <p:blipFill>
+          <a:blip r:embed="rId3"/>
+          <a:stretch>
+            <a:fillRect/>
+          </a:stretch>
+        </p:blipFill>
+        <p:spPr>
+          <a:xfrm>
+            <a:off x="2635740" y="1739091"/>
+            <a:ext cx="7072919" cy="4984536"/>
+          </a:xfrm>
+          <a:prstGeom prst="rect">
+            <a:avLst/>
+          </a:prstGeom>
+        </p:spPr>
+      </p:pic>
+    </p:spTree>
+    <p:extLst>
+      <p:ext uri="{BB962C8B-B14F-4D97-AF65-F5344CB8AC3E}">
+        <p14:creationId xmlns:p14="http://schemas.microsoft.com/office/powerpoint/2010/main" val="2237705964"/>
+      </p:ext>
+    </p:extLst>
+  </p:cSld>
+  <p:clrMapOvr>
+    <a:masterClrMapping/>
+  </p:clrMapOvr>
+</p:sld>
+</file>
+
+<file path=ppt/slides/slide49.xml><?xml version="1.0" encoding="utf-8"?>
+<p:sld xmlns:a="http://schemas.openxmlformats.org/drawingml/2006/main" xmlns:r="http://schemas.openxmlformats.org/officeDocument/2006/relationships" xmlns:p="http://schemas.openxmlformats.org/presentationml/2006/main">
+  <p:cSld>
+    <p:spTree>
+      <p:nvGrpSpPr>
+        <p:cNvPr id="1" name=""/>
+        <p:cNvGrpSpPr/>
+        <p:nvPr/>
+      </p:nvGrpSpPr>
+      <p:grpSpPr>
+        <a:xfrm>
+          <a:off x="0" y="0"/>
+          <a:ext cx="0" cy="0"/>
+          <a:chOff x="0" y="0"/>
+          <a:chExt cx="0" cy="0"/>
+        </a:xfrm>
+      </p:grpSpPr>
+      <p:sp>
+        <p:nvSpPr>
+          <p:cNvPr id="3" name="Объект 2"/>
+          <p:cNvSpPr>
+            <a:spLocks noGrp="1"/>
+          </p:cNvSpPr>
+          <p:nvPr>
+            <p:ph idx="1"/>
+          </p:nvPr>
+        </p:nvSpPr>
+        <p:spPr>
+          <a:xfrm>
+            <a:off x="1487979" y="955963"/>
+            <a:ext cx="9601200" cy="3581400"/>
+          </a:xfrm>
+        </p:spPr>
+        <p:txBody>
+          <a:bodyPr/>
+          <a:lstStyle/>
+          <a:p>
+            <a:r>
+              <a:rPr lang="ru-RU" dirty="0"/>
+              <a:t>В </a:t>
+            </a:r>
+            <a:r>
+              <a:rPr lang="ru-RU" dirty="0" smtClean="0"/>
+              <a:t>примере </a:t>
+            </a:r>
+            <a:r>
+              <a:rPr lang="ru-RU" dirty="0"/>
+              <a:t>мы отображали данные по экспорту за разные года, однако точечный тип не очень подходит для данного типа графика, поскольку он показывает динамику изменения. А это означает, что желательно соединить точки линиями. Для этого используем геометрию </a:t>
+            </a:r>
+            <a:r>
+              <a:rPr lang="ru-RU" dirty="0" err="1"/>
+              <a:t>geom_line</a:t>
+            </a:r>
+            <a:r>
+              <a:rPr lang="ru-RU" dirty="0"/>
+              <a:t>():</a:t>
+            </a:r>
+          </a:p>
+        </p:txBody>
+      </p:sp>
+      <p:pic>
+        <p:nvPicPr>
+          <p:cNvPr id="5" name="Рисунок 4"/>
+          <p:cNvPicPr>
+            <a:picLocks noChangeAspect="1"/>
+          </p:cNvPicPr>
+          <p:nvPr/>
+        </p:nvPicPr>
+        <p:blipFill>
+          <a:blip r:embed="rId2"/>
+          <a:stretch>
+            <a:fillRect/>
+          </a:stretch>
+        </p:blipFill>
+        <p:spPr>
+          <a:xfrm>
+            <a:off x="2322628" y="3233391"/>
+            <a:ext cx="8650036" cy="1164042"/>
+          </a:xfrm>
+          <a:prstGeom prst="rect">
+            <a:avLst/>
+          </a:prstGeom>
+        </p:spPr>
+      </p:pic>
+    </p:spTree>
+    <p:extLst>
+      <p:ext uri="{BB962C8B-B14F-4D97-AF65-F5344CB8AC3E}">
+        <p14:creationId xmlns:p14="http://schemas.microsoft.com/office/powerpoint/2010/main" val="3350636230"/>
+      </p:ext>
+    </p:extLst>
+  </p:cSld>
+  <p:clrMapOvr>
+    <a:masterClrMapping/>
+  </p:clrMapOvr>
+</p:sld>
+</file>
+
 <file path=ppt/slides/slide5.xml><?xml version="1.0" encoding="utf-8"?>
 <p:sld xmlns:a="http://schemas.openxmlformats.org/drawingml/2006/main" xmlns:r="http://schemas.openxmlformats.org/officeDocument/2006/relationships" xmlns:p="http://schemas.openxmlformats.org/presentationml/2006/main">
   <p:cSld>
@@ -8424,6 +9078,734 @@
       </p:par>
     </p:tnLst>
   </p:timing>
+</p:sld>
+</file>
+
+<file path=ppt/slides/slide50.xml><?xml version="1.0" encoding="utf-8"?>
+<p:sld xmlns:a="http://schemas.openxmlformats.org/drawingml/2006/main" xmlns:r="http://schemas.openxmlformats.org/officeDocument/2006/relationships" xmlns:p="http://schemas.openxmlformats.org/presentationml/2006/main">
+  <p:cSld>
+    <p:spTree>
+      <p:nvGrpSpPr>
+        <p:cNvPr id="1" name=""/>
+        <p:cNvGrpSpPr/>
+        <p:nvPr/>
+      </p:nvGrpSpPr>
+      <p:grpSpPr>
+        <a:xfrm>
+          <a:off x="0" y="0"/>
+          <a:ext cx="0" cy="0"/>
+          <a:chOff x="0" y="0"/>
+          <a:chExt cx="0" cy="0"/>
+        </a:xfrm>
+      </p:grpSpPr>
+      <p:sp>
+        <p:nvSpPr>
+          <p:cNvPr id="2" name="Заголовок 1"/>
+          <p:cNvSpPr>
+            <a:spLocks noGrp="1"/>
+          </p:cNvSpPr>
+          <p:nvPr>
+            <p:ph type="title"/>
+          </p:nvPr>
+        </p:nvSpPr>
+        <p:spPr/>
+        <p:txBody>
+          <a:bodyPr/>
+          <a:lstStyle/>
+          <a:p>
+            <a:endParaRPr lang="ru-RU" dirty="0"/>
+          </a:p>
+        </p:txBody>
+      </p:sp>
+      <p:sp>
+        <p:nvSpPr>
+          <p:cNvPr id="3" name="Объект 2"/>
+          <p:cNvSpPr>
+            <a:spLocks noGrp="1"/>
+          </p:cNvSpPr>
+          <p:nvPr>
+            <p:ph idx="1"/>
+          </p:nvPr>
+        </p:nvSpPr>
+        <p:spPr/>
+        <p:txBody>
+          <a:bodyPr/>
+          <a:lstStyle/>
+          <a:p>
+            <a:endParaRPr lang="ru-RU"/>
+          </a:p>
+        </p:txBody>
+      </p:sp>
+      <p:pic>
+        <p:nvPicPr>
+          <p:cNvPr id="4" name="Рисунок 3"/>
+          <p:cNvPicPr>
+            <a:picLocks noChangeAspect="1"/>
+          </p:cNvPicPr>
+          <p:nvPr/>
+        </p:nvPicPr>
+        <p:blipFill>
+          <a:blip r:embed="rId2"/>
+          <a:stretch>
+            <a:fillRect/>
+          </a:stretch>
+        </p:blipFill>
+        <p:spPr>
+          <a:xfrm>
+            <a:off x="1959465" y="157942"/>
+            <a:ext cx="8888644" cy="6441414"/>
+          </a:xfrm>
+          <a:prstGeom prst="rect">
+            <a:avLst/>
+          </a:prstGeom>
+        </p:spPr>
+      </p:pic>
+    </p:spTree>
+    <p:extLst>
+      <p:ext uri="{BB962C8B-B14F-4D97-AF65-F5344CB8AC3E}">
+        <p14:creationId xmlns:p14="http://schemas.microsoft.com/office/powerpoint/2010/main" val="1566949552"/>
+      </p:ext>
+    </p:extLst>
+  </p:cSld>
+  <p:clrMapOvr>
+    <a:masterClrMapping/>
+  </p:clrMapOvr>
+</p:sld>
+</file>
+
+<file path=ppt/slides/slide51.xml><?xml version="1.0" encoding="utf-8"?>
+<p:sld xmlns:a="http://schemas.openxmlformats.org/drawingml/2006/main" xmlns:r="http://schemas.openxmlformats.org/officeDocument/2006/relationships" xmlns:p="http://schemas.openxmlformats.org/presentationml/2006/main">
+  <p:cSld>
+    <p:spTree>
+      <p:nvGrpSpPr>
+        <p:cNvPr id="1" name=""/>
+        <p:cNvGrpSpPr/>
+        <p:nvPr/>
+      </p:nvGrpSpPr>
+      <p:grpSpPr>
+        <a:xfrm>
+          <a:off x="0" y="0"/>
+          <a:ext cx="0" cy="0"/>
+          <a:chOff x="0" y="0"/>
+          <a:chExt cx="0" cy="0"/>
+        </a:xfrm>
+      </p:grpSpPr>
+      <p:pic>
+        <p:nvPicPr>
+          <p:cNvPr id="4" name="Рисунок 3"/>
+          <p:cNvPicPr>
+            <a:picLocks noChangeAspect="1"/>
+          </p:cNvPicPr>
+          <p:nvPr/>
+        </p:nvPicPr>
+        <p:blipFill>
+          <a:blip r:embed="rId2"/>
+          <a:stretch>
+            <a:fillRect/>
+          </a:stretch>
+        </p:blipFill>
+        <p:spPr>
+          <a:xfrm>
+            <a:off x="3133897" y="207732"/>
+            <a:ext cx="5644344" cy="728730"/>
+          </a:xfrm>
+          <a:prstGeom prst="rect">
+            <a:avLst/>
+          </a:prstGeom>
+        </p:spPr>
+      </p:pic>
+      <p:pic>
+        <p:nvPicPr>
+          <p:cNvPr id="5" name="Рисунок 4"/>
+          <p:cNvPicPr>
+            <a:picLocks noChangeAspect="1"/>
+          </p:cNvPicPr>
+          <p:nvPr/>
+        </p:nvPicPr>
+        <p:blipFill>
+          <a:blip r:embed="rId3"/>
+          <a:stretch>
+            <a:fillRect/>
+          </a:stretch>
+        </p:blipFill>
+        <p:spPr>
+          <a:xfrm>
+            <a:off x="2383329" y="1020299"/>
+            <a:ext cx="7891202" cy="5695486"/>
+          </a:xfrm>
+          <a:prstGeom prst="rect">
+            <a:avLst/>
+          </a:prstGeom>
+        </p:spPr>
+      </p:pic>
+    </p:spTree>
+    <p:extLst>
+      <p:ext uri="{BB962C8B-B14F-4D97-AF65-F5344CB8AC3E}">
+        <p14:creationId xmlns:p14="http://schemas.microsoft.com/office/powerpoint/2010/main" val="162232202"/>
+      </p:ext>
+    </p:extLst>
+  </p:cSld>
+  <p:clrMapOvr>
+    <a:masterClrMapping/>
+  </p:clrMapOvr>
+</p:sld>
+</file>
+
+<file path=ppt/slides/slide52.xml><?xml version="1.0" encoding="utf-8"?>
+<p:sld xmlns:a="http://schemas.openxmlformats.org/drawingml/2006/main" xmlns:r="http://schemas.openxmlformats.org/officeDocument/2006/relationships" xmlns:p="http://schemas.openxmlformats.org/presentationml/2006/main">
+  <p:cSld>
+    <p:spTree>
+      <p:nvGrpSpPr>
+        <p:cNvPr id="1" name=""/>
+        <p:cNvGrpSpPr/>
+        <p:nvPr/>
+      </p:nvGrpSpPr>
+      <p:grpSpPr>
+        <a:xfrm>
+          <a:off x="0" y="0"/>
+          <a:ext cx="0" cy="0"/>
+          <a:chOff x="0" y="0"/>
+          <a:chExt cx="0" cy="0"/>
+        </a:xfrm>
+      </p:grpSpPr>
+      <p:sp>
+        <p:nvSpPr>
+          <p:cNvPr id="3" name="Объект 2"/>
+          <p:cNvSpPr>
+            <a:spLocks noGrp="1"/>
+          </p:cNvSpPr>
+          <p:nvPr>
+            <p:ph idx="1"/>
+          </p:nvPr>
+        </p:nvSpPr>
+        <p:spPr>
+          <a:xfrm>
+            <a:off x="1695797" y="83128"/>
+            <a:ext cx="9601200" cy="3581400"/>
+          </a:xfrm>
+        </p:spPr>
+        <p:txBody>
+          <a:bodyPr/>
+          <a:lstStyle/>
+          <a:p>
+            <a:r>
+              <a:rPr lang="ru-RU" dirty="0"/>
+              <a:t>Можно совместить несколько геометрий, добавив их последовательно на график:</a:t>
+            </a:r>
+            <a:endParaRPr lang="ru-RU" dirty="0"/>
+          </a:p>
+        </p:txBody>
+      </p:sp>
+      <p:pic>
+        <p:nvPicPr>
+          <p:cNvPr id="4" name="Рисунок 3"/>
+          <p:cNvPicPr>
+            <a:picLocks noChangeAspect="1"/>
+          </p:cNvPicPr>
+          <p:nvPr/>
+        </p:nvPicPr>
+        <p:blipFill>
+          <a:blip r:embed="rId2"/>
+          <a:stretch>
+            <a:fillRect/>
+          </a:stretch>
+        </p:blipFill>
+        <p:spPr>
+          <a:xfrm>
+            <a:off x="3475240" y="881106"/>
+            <a:ext cx="5764806" cy="944447"/>
+          </a:xfrm>
+          <a:prstGeom prst="rect">
+            <a:avLst/>
+          </a:prstGeom>
+        </p:spPr>
+      </p:pic>
+      <p:pic>
+        <p:nvPicPr>
+          <p:cNvPr id="5" name="Рисунок 4"/>
+          <p:cNvPicPr>
+            <a:picLocks noChangeAspect="1"/>
+          </p:cNvPicPr>
+          <p:nvPr/>
+        </p:nvPicPr>
+        <p:blipFill>
+          <a:blip r:embed="rId3"/>
+          <a:stretch>
+            <a:fillRect/>
+          </a:stretch>
+        </p:blipFill>
+        <p:spPr>
+          <a:xfrm>
+            <a:off x="2745624" y="1873828"/>
+            <a:ext cx="7196397" cy="4819650"/>
+          </a:xfrm>
+          <a:prstGeom prst="rect">
+            <a:avLst/>
+          </a:prstGeom>
+        </p:spPr>
+      </p:pic>
+    </p:spTree>
+    <p:extLst>
+      <p:ext uri="{BB962C8B-B14F-4D97-AF65-F5344CB8AC3E}">
+        <p14:creationId xmlns:p14="http://schemas.microsoft.com/office/powerpoint/2010/main" val="2104982009"/>
+      </p:ext>
+    </p:extLst>
+  </p:cSld>
+  <p:clrMapOvr>
+    <a:masterClrMapping/>
+  </p:clrMapOvr>
+</p:sld>
+</file>
+
+<file path=ppt/slides/slide53.xml><?xml version="1.0" encoding="utf-8"?>
+<p:sld xmlns:a="http://schemas.openxmlformats.org/drawingml/2006/main" xmlns:r="http://schemas.openxmlformats.org/officeDocument/2006/relationships" xmlns:p="http://schemas.openxmlformats.org/presentationml/2006/main">
+  <p:cSld>
+    <p:spTree>
+      <p:nvGrpSpPr>
+        <p:cNvPr id="1" name=""/>
+        <p:cNvGrpSpPr/>
+        <p:nvPr/>
+      </p:nvGrpSpPr>
+      <p:grpSpPr>
+        <a:xfrm>
+          <a:off x="0" y="0"/>
+          <a:ext cx="0" cy="0"/>
+          <a:chOff x="0" y="0"/>
+          <a:chExt cx="0" cy="0"/>
+        </a:xfrm>
+      </p:grpSpPr>
+      <p:sp>
+        <p:nvSpPr>
+          <p:cNvPr id="3" name="Объект 2"/>
+          <p:cNvSpPr>
+            <a:spLocks noGrp="1"/>
+          </p:cNvSpPr>
+          <p:nvPr>
+            <p:ph idx="1"/>
+          </p:nvPr>
+        </p:nvSpPr>
+        <p:spPr>
+          <a:xfrm>
+            <a:off x="1346662" y="174567"/>
+            <a:ext cx="9601200" cy="3581400"/>
+          </a:xfrm>
+        </p:spPr>
+        <p:txBody>
+          <a:bodyPr/>
+          <a:lstStyle/>
+          <a:p>
+            <a:r>
+              <a:rPr lang="ru-RU" dirty="0"/>
+              <a:t>Если у нескольких геометрий одинаковые отображения, их можно вынести в вызов функции </a:t>
+            </a:r>
+            <a:r>
+              <a:rPr lang="ru-RU" dirty="0" err="1"/>
+              <a:t>ggplot</a:t>
+            </a:r>
+            <a:r>
+              <a:rPr lang="ru-RU" dirty="0"/>
+              <a:t>() (чтобы не дублировать):</a:t>
+            </a:r>
+          </a:p>
+        </p:txBody>
+      </p:sp>
+      <p:pic>
+        <p:nvPicPr>
+          <p:cNvPr id="5" name="Рисунок 4"/>
+          <p:cNvPicPr>
+            <a:picLocks noChangeAspect="1"/>
+          </p:cNvPicPr>
+          <p:nvPr/>
+        </p:nvPicPr>
+        <p:blipFill>
+          <a:blip r:embed="rId2"/>
+          <a:stretch>
+            <a:fillRect/>
+          </a:stretch>
+        </p:blipFill>
+        <p:spPr>
+          <a:xfrm>
+            <a:off x="3006802" y="896217"/>
+            <a:ext cx="6425372" cy="849456"/>
+          </a:xfrm>
+          <a:prstGeom prst="rect">
+            <a:avLst/>
+          </a:prstGeom>
+        </p:spPr>
+      </p:pic>
+      <p:pic>
+        <p:nvPicPr>
+          <p:cNvPr id="6" name="Рисунок 5"/>
+          <p:cNvPicPr>
+            <a:picLocks noChangeAspect="1"/>
+          </p:cNvPicPr>
+          <p:nvPr/>
+        </p:nvPicPr>
+        <p:blipFill>
+          <a:blip r:embed="rId3"/>
+          <a:stretch>
+            <a:fillRect/>
+          </a:stretch>
+        </p:blipFill>
+        <p:spPr>
+          <a:xfrm>
+            <a:off x="2726573" y="1845425"/>
+            <a:ext cx="7157259" cy="4772025"/>
+          </a:xfrm>
+          <a:prstGeom prst="rect">
+            <a:avLst/>
+          </a:prstGeom>
+        </p:spPr>
+      </p:pic>
+    </p:spTree>
+    <p:extLst>
+      <p:ext uri="{BB962C8B-B14F-4D97-AF65-F5344CB8AC3E}">
+        <p14:creationId xmlns:p14="http://schemas.microsoft.com/office/powerpoint/2010/main" val="95417672"/>
+      </p:ext>
+    </p:extLst>
+  </p:cSld>
+  <p:clrMapOvr>
+    <a:masterClrMapping/>
+  </p:clrMapOvr>
+</p:sld>
+</file>
+
+<file path=ppt/slides/slide54.xml><?xml version="1.0" encoding="utf-8"?>
+<p:sld xmlns:a="http://schemas.openxmlformats.org/drawingml/2006/main" xmlns:r="http://schemas.openxmlformats.org/officeDocument/2006/relationships" xmlns:p="http://schemas.openxmlformats.org/presentationml/2006/main">
+  <p:cSld>
+    <p:spTree>
+      <p:nvGrpSpPr>
+        <p:cNvPr id="1" name=""/>
+        <p:cNvGrpSpPr/>
+        <p:nvPr/>
+      </p:nvGrpSpPr>
+      <p:grpSpPr>
+        <a:xfrm>
+          <a:off x="0" y="0"/>
+          <a:ext cx="0" cy="0"/>
+          <a:chOff x="0" y="0"/>
+          <a:chExt cx="0" cy="0"/>
+        </a:xfrm>
+      </p:grpSpPr>
+      <p:sp>
+        <p:nvSpPr>
+          <p:cNvPr id="3" name="Объект 2"/>
+          <p:cNvSpPr>
+            <a:spLocks noGrp="1"/>
+          </p:cNvSpPr>
+          <p:nvPr>
+            <p:ph idx="1"/>
+          </p:nvPr>
+        </p:nvSpPr>
+        <p:spPr>
+          <a:xfrm>
+            <a:off x="1612669" y="99753"/>
+            <a:ext cx="9601200" cy="3581400"/>
+          </a:xfrm>
+        </p:spPr>
+        <p:txBody>
+          <a:bodyPr/>
+          <a:lstStyle/>
+          <a:p>
+            <a:r>
+              <a:rPr lang="ru-RU" dirty="0"/>
+              <a:t>Наглядность линейного графика можно усилить, добавив “заливку” области с использованием </a:t>
+            </a:r>
+            <a:r>
+              <a:rPr lang="ru-RU" dirty="0" err="1"/>
+              <a:t>geom_area</a:t>
+            </a:r>
+            <a:r>
+              <a:rPr lang="ru-RU" dirty="0"/>
+              <a:t>():</a:t>
+            </a:r>
+          </a:p>
+        </p:txBody>
+      </p:sp>
+      <p:pic>
+        <p:nvPicPr>
+          <p:cNvPr id="5" name="Рисунок 4"/>
+          <p:cNvPicPr>
+            <a:picLocks noChangeAspect="1"/>
+          </p:cNvPicPr>
+          <p:nvPr/>
+        </p:nvPicPr>
+        <p:blipFill>
+          <a:blip r:embed="rId2"/>
+          <a:stretch>
+            <a:fillRect/>
+          </a:stretch>
+        </p:blipFill>
+        <p:spPr>
+          <a:xfrm>
+            <a:off x="2952404" y="777846"/>
+            <a:ext cx="6275420" cy="1113039"/>
+          </a:xfrm>
+          <a:prstGeom prst="rect">
+            <a:avLst/>
+          </a:prstGeom>
+        </p:spPr>
+      </p:pic>
+      <p:pic>
+        <p:nvPicPr>
+          <p:cNvPr id="6" name="Рисунок 5"/>
+          <p:cNvPicPr>
+            <a:picLocks noChangeAspect="1"/>
+          </p:cNvPicPr>
+          <p:nvPr/>
+        </p:nvPicPr>
+        <p:blipFill>
+          <a:blip r:embed="rId3"/>
+          <a:stretch>
+            <a:fillRect/>
+          </a:stretch>
+        </p:blipFill>
+        <p:spPr>
+          <a:xfrm>
+            <a:off x="2205038" y="1958946"/>
+            <a:ext cx="7329660" cy="4800600"/>
+          </a:xfrm>
+          <a:prstGeom prst="rect">
+            <a:avLst/>
+          </a:prstGeom>
+        </p:spPr>
+      </p:pic>
+    </p:spTree>
+    <p:extLst>
+      <p:ext uri="{BB962C8B-B14F-4D97-AF65-F5344CB8AC3E}">
+        <p14:creationId xmlns:p14="http://schemas.microsoft.com/office/powerpoint/2010/main" val="3392548354"/>
+      </p:ext>
+    </p:extLst>
+  </p:cSld>
+  <p:clrMapOvr>
+    <a:masterClrMapping/>
+  </p:clrMapOvr>
+</p:sld>
+</file>
+
+<file path=ppt/slides/slide55.xml><?xml version="1.0" encoding="utf-8"?>
+<p:sld xmlns:a="http://schemas.openxmlformats.org/drawingml/2006/main" xmlns:r="http://schemas.openxmlformats.org/officeDocument/2006/relationships" xmlns:p="http://schemas.openxmlformats.org/presentationml/2006/main">
+  <p:cSld>
+    <p:spTree>
+      <p:nvGrpSpPr>
+        <p:cNvPr id="1" name=""/>
+        <p:cNvGrpSpPr/>
+        <p:nvPr/>
+      </p:nvGrpSpPr>
+      <p:grpSpPr>
+        <a:xfrm>
+          <a:off x="0" y="0"/>
+          <a:ext cx="0" cy="0"/>
+          <a:chOff x="0" y="0"/>
+          <a:chExt cx="0" cy="0"/>
+        </a:xfrm>
+      </p:grpSpPr>
+      <p:sp>
+        <p:nvSpPr>
+          <p:cNvPr id="7" name="Объект 6"/>
+          <p:cNvSpPr>
+            <a:spLocks noGrp="1"/>
+          </p:cNvSpPr>
+          <p:nvPr>
+            <p:ph idx="1"/>
+          </p:nvPr>
+        </p:nvSpPr>
+        <p:spPr>
+          <a:xfrm>
+            <a:off x="1537854" y="99753"/>
+            <a:ext cx="9601200" cy="3581400"/>
+          </a:xfrm>
+        </p:spPr>
+        <p:txBody>
+          <a:bodyPr/>
+          <a:lstStyle/>
+          <a:p>
+            <a:r>
+              <a:rPr lang="ru-RU" dirty="0"/>
+              <a:t>Для построения столбчатой диаграммы следует использовать геометрию </a:t>
+            </a:r>
+            <a:r>
+              <a:rPr lang="ru-RU" dirty="0" err="1"/>
+              <a:t>geom_col</a:t>
+            </a:r>
+            <a:r>
+              <a:rPr lang="ru-RU" dirty="0"/>
+              <a:t>()</a:t>
+            </a:r>
+          </a:p>
+        </p:txBody>
+      </p:sp>
+      <p:pic>
+        <p:nvPicPr>
+          <p:cNvPr id="9" name="Рисунок 8"/>
+          <p:cNvPicPr>
+            <a:picLocks noChangeAspect="1"/>
+          </p:cNvPicPr>
+          <p:nvPr/>
+        </p:nvPicPr>
+        <p:blipFill>
+          <a:blip r:embed="rId2"/>
+          <a:stretch>
+            <a:fillRect/>
+          </a:stretch>
+        </p:blipFill>
+        <p:spPr>
+          <a:xfrm>
+            <a:off x="3234689" y="943147"/>
+            <a:ext cx="6151367" cy="328699"/>
+          </a:xfrm>
+          <a:prstGeom prst="rect">
+            <a:avLst/>
+          </a:prstGeom>
+        </p:spPr>
+      </p:pic>
+      <p:pic>
+        <p:nvPicPr>
+          <p:cNvPr id="10" name="Рисунок 9"/>
+          <p:cNvPicPr>
+            <a:picLocks noChangeAspect="1"/>
+          </p:cNvPicPr>
+          <p:nvPr/>
+        </p:nvPicPr>
+        <p:blipFill>
+          <a:blip r:embed="rId3"/>
+          <a:stretch>
+            <a:fillRect/>
+          </a:stretch>
+        </p:blipFill>
+        <p:spPr>
+          <a:xfrm>
+            <a:off x="2504468" y="1384934"/>
+            <a:ext cx="7545619" cy="5400401"/>
+          </a:xfrm>
+          <a:prstGeom prst="rect">
+            <a:avLst/>
+          </a:prstGeom>
+        </p:spPr>
+      </p:pic>
+    </p:spTree>
+    <p:extLst>
+      <p:ext uri="{BB962C8B-B14F-4D97-AF65-F5344CB8AC3E}">
+        <p14:creationId xmlns:p14="http://schemas.microsoft.com/office/powerpoint/2010/main" val="3445781135"/>
+      </p:ext>
+    </p:extLst>
+  </p:cSld>
+  <p:clrMapOvr>
+    <a:masterClrMapping/>
+  </p:clrMapOvr>
+</p:sld>
+</file>
+
+<file path=ppt/slides/slide56.xml><?xml version="1.0" encoding="utf-8"?>
+<p:sld xmlns:a="http://schemas.openxmlformats.org/drawingml/2006/main" xmlns:r="http://schemas.openxmlformats.org/officeDocument/2006/relationships" xmlns:p="http://schemas.openxmlformats.org/presentationml/2006/main">
+  <p:cSld>
+    <p:spTree>
+      <p:nvGrpSpPr>
+        <p:cNvPr id="1" name=""/>
+        <p:cNvGrpSpPr/>
+        <p:nvPr/>
+      </p:nvGrpSpPr>
+      <p:grpSpPr>
+        <a:xfrm>
+          <a:off x="0" y="0"/>
+          <a:ext cx="0" cy="0"/>
+          <a:chOff x="0" y="0"/>
+          <a:chExt cx="0" cy="0"/>
+        </a:xfrm>
+      </p:grpSpPr>
+      <p:sp>
+        <p:nvSpPr>
+          <p:cNvPr id="3" name="Объект 2"/>
+          <p:cNvSpPr>
+            <a:spLocks noGrp="1"/>
+          </p:cNvSpPr>
+          <p:nvPr>
+            <p:ph idx="1"/>
+          </p:nvPr>
+        </p:nvSpPr>
+        <p:spPr>
+          <a:xfrm>
+            <a:off x="1820487" y="74815"/>
+            <a:ext cx="9601200" cy="3581400"/>
+          </a:xfrm>
+        </p:spPr>
+        <p:txBody>
+          <a:bodyPr/>
+          <a:lstStyle/>
+          <a:p>
+            <a:r>
+              <a:rPr lang="ru-RU" dirty="0"/>
+              <a:t>Развернуть диаграмму можно, используя функцию </a:t>
+            </a:r>
+            <a:r>
+              <a:rPr lang="ru-RU" dirty="0" err="1"/>
+              <a:t>coord_flip</a:t>
+            </a:r>
+            <a:r>
+              <a:rPr lang="ru-RU" dirty="0"/>
+              <a:t>():</a:t>
+            </a:r>
+          </a:p>
+        </p:txBody>
+      </p:sp>
+      <p:pic>
+        <p:nvPicPr>
+          <p:cNvPr id="6" name="Рисунок 5"/>
+          <p:cNvPicPr>
+            <a:picLocks noChangeAspect="1"/>
+          </p:cNvPicPr>
+          <p:nvPr/>
+        </p:nvPicPr>
+        <p:blipFill>
+          <a:blip r:embed="rId2"/>
+          <a:stretch>
+            <a:fillRect/>
+          </a:stretch>
+        </p:blipFill>
+        <p:spPr>
+          <a:xfrm>
+            <a:off x="2368433" y="638780"/>
+            <a:ext cx="7180997" cy="616441"/>
+          </a:xfrm>
+          <a:prstGeom prst="rect">
+            <a:avLst/>
+          </a:prstGeom>
+        </p:spPr>
+      </p:pic>
+      <p:pic>
+        <p:nvPicPr>
+          <p:cNvPr id="7" name="Рисунок 6"/>
+          <p:cNvPicPr>
+            <a:picLocks noChangeAspect="1"/>
+          </p:cNvPicPr>
+          <p:nvPr/>
+        </p:nvPicPr>
+        <p:blipFill>
+          <a:blip r:embed="rId3"/>
+          <a:stretch>
+            <a:fillRect/>
+          </a:stretch>
+        </p:blipFill>
+        <p:spPr>
+          <a:xfrm>
+            <a:off x="2242097" y="1341033"/>
+            <a:ext cx="7415398" cy="5320892"/>
+          </a:xfrm>
+          <a:prstGeom prst="rect">
+            <a:avLst/>
+          </a:prstGeom>
+        </p:spPr>
+      </p:pic>
+    </p:spTree>
+    <p:extLst>
+      <p:ext uri="{BB962C8B-B14F-4D97-AF65-F5344CB8AC3E}">
+        <p14:creationId xmlns:p14="http://schemas.microsoft.com/office/powerpoint/2010/main" val="3465992080"/>
+      </p:ext>
+    </p:extLst>
+  </p:cSld>
+  <p:clrMapOvr>
+    <a:masterClrMapping/>
+  </p:clrMapOvr>
 </p:sld>
 </file>
 

</xml_diff>